<commit_message>
TUMP 9주차_7 승&패 state 생성
</commit_message>
<xml_diff>
--- a/document/2DGP_중간.pptx
+++ b/document/2DGP_중간.pptx
@@ -1327,7 +1327,7 @@
             <a:fld id="{9334D819-9F07-4261-B09B-9E467E5D9002}" type="datetimeFigureOut">
               <a:rPr lang="en-US" dirty="0"/>
               <a:pPr/>
-              <a:t>11/27/2018</a:t>
+              <a:t>11/29/2018</a:t>
             </a:fld>
             <a:endParaRPr lang="en-US" dirty="0"/>
           </a:p>
@@ -1561,7 +1561,7 @@
           <a:p>
             <a:fld id="{9334D819-9F07-4261-B09B-9E467E5D9002}" type="datetimeFigureOut">
               <a:rPr lang="en-US" dirty="0"/>
-              <a:t>11/27/2018</a:t>
+              <a:t>11/29/2018</a:t>
             </a:fld>
             <a:endParaRPr lang="en-US" dirty="0"/>
           </a:p>
@@ -1736,7 +1736,7 @@
           <a:p>
             <a:fld id="{9334D819-9F07-4261-B09B-9E467E5D9002}" type="datetimeFigureOut">
               <a:rPr lang="en-US" dirty="0"/>
-              <a:t>11/27/2018</a:t>
+              <a:t>11/29/2018</a:t>
             </a:fld>
             <a:endParaRPr lang="en-US" dirty="0"/>
           </a:p>
@@ -1901,7 +1901,7 @@
           <a:p>
             <a:fld id="{9334D819-9F07-4261-B09B-9E467E5D9002}" type="datetimeFigureOut">
               <a:rPr lang="en-US" dirty="0"/>
-              <a:t>11/27/2018</a:t>
+              <a:t>11/29/2018</a:t>
             </a:fld>
             <a:endParaRPr lang="en-US" dirty="0"/>
           </a:p>
@@ -2170,7 +2170,7 @@
             <a:fld id="{9334D819-9F07-4261-B09B-9E467E5D9002}" type="datetimeFigureOut">
               <a:rPr lang="en-US" dirty="0"/>
               <a:pPr/>
-              <a:t>11/27/2018</a:t>
+              <a:t>11/29/2018</a:t>
             </a:fld>
             <a:endParaRPr lang="en-US" dirty="0"/>
           </a:p>
@@ -3367,7 +3367,7 @@
           <a:p>
             <a:fld id="{9334D819-9F07-4261-B09B-9E467E5D9002}" type="datetimeFigureOut">
               <a:rPr lang="en-US" dirty="0"/>
-              <a:t>11/27/2018</a:t>
+              <a:t>11/29/2018</a:t>
             </a:fld>
             <a:endParaRPr lang="en-US" dirty="0"/>
           </a:p>
@@ -3752,7 +3752,7 @@
           <a:p>
             <a:fld id="{9334D819-9F07-4261-B09B-9E467E5D9002}" type="datetimeFigureOut">
               <a:rPr lang="en-US" dirty="0"/>
-              <a:t>11/27/2018</a:t>
+              <a:t>11/29/2018</a:t>
             </a:fld>
             <a:endParaRPr lang="en-US" dirty="0"/>
           </a:p>
@@ -3870,7 +3870,7 @@
           <a:p>
             <a:fld id="{9334D819-9F07-4261-B09B-9E467E5D9002}" type="datetimeFigureOut">
               <a:rPr lang="en-US" dirty="0"/>
-              <a:t>11/27/2018</a:t>
+              <a:t>11/29/2018</a:t>
             </a:fld>
             <a:endParaRPr lang="en-US" dirty="0"/>
           </a:p>
@@ -3960,7 +3960,7 @@
           <a:p>
             <a:fld id="{9334D819-9F07-4261-B09B-9E467E5D9002}" type="datetimeFigureOut">
               <a:rPr lang="en-US" dirty="0"/>
-              <a:t>11/27/2018</a:t>
+              <a:t>11/29/2018</a:t>
             </a:fld>
             <a:endParaRPr lang="en-US" dirty="0"/>
           </a:p>
@@ -4718,7 +4718,7 @@
           <a:p>
             <a:fld id="{9334D819-9F07-4261-B09B-9E467E5D9002}" type="datetimeFigureOut">
               <a:rPr lang="en-US" dirty="0"/>
-              <a:t>11/27/2018</a:t>
+              <a:t>11/29/2018</a:t>
             </a:fld>
             <a:endParaRPr lang="en-US" dirty="0"/>
           </a:p>
@@ -5553,7 +5553,7 @@
           <a:p>
             <a:fld id="{9334D819-9F07-4261-B09B-9E467E5D9002}" type="datetimeFigureOut">
               <a:rPr lang="en-US" dirty="0"/>
-              <a:t>11/27/2018</a:t>
+              <a:t>11/29/2018</a:t>
             </a:fld>
             <a:endParaRPr lang="en-US" dirty="0"/>
           </a:p>
@@ -5776,7 +5776,7 @@
             <a:fld id="{9334D819-9F07-4261-B09B-9E467E5D9002}" type="datetimeFigureOut">
               <a:rPr lang="en-US" dirty="0"/>
               <a:pPr/>
-              <a:t>11/27/2018</a:t>
+              <a:t>11/29/2018</a:t>
             </a:fld>
             <a:endParaRPr lang="en-US" dirty="0"/>
           </a:p>
@@ -11203,7 +11203,7 @@
           <p:nvPr>
             <p:extLst>
               <p:ext uri="{D42A27DB-BD31-4B8C-83A1-F6EECF244321}">
-                <p14:modId xmlns:p14="http://schemas.microsoft.com/office/powerpoint/2010/main" val="3053402274"/>
+                <p14:modId xmlns:p14="http://schemas.microsoft.com/office/powerpoint/2010/main" val="3823444502"/>
               </p:ext>
             </p:extLst>
           </p:nvPr>
@@ -11597,7 +11597,7 @@
                             </a:schemeClr>
                           </a:solidFill>
                         </a:rPr>
-                        <a:t>맵 수집 및 변경 △</a:t>
+                        <a:t>맵 수집 및 변경 ○</a:t>
                       </a:r>
                       <a:endParaRPr lang="en-US" altLang="ko-KR" sz="1400" dirty="0">
                         <a:solidFill>
@@ -13043,7 +13043,7 @@
                         <a:buNone/>
                       </a:pPr>
                       <a:r>
-                        <a:rPr lang="en-US" altLang="ko-KR" sz="1400" dirty="0">
+                        <a:rPr lang="en-US" altLang="ko-KR" sz="1400" strike="sngStrike" dirty="0">
                           <a:solidFill>
                             <a:schemeClr val="tx2">
                               <a:lumMod val="90000"/>
@@ -13054,7 +13054,7 @@
                         <a:t>2.  </a:t>
                       </a:r>
                       <a:r>
-                        <a:rPr lang="ko-KR" altLang="en-US" sz="1400" dirty="0">
+                        <a:rPr lang="ko-KR" altLang="en-US" sz="1400" strike="sngStrike" dirty="0">
                           <a:solidFill>
                             <a:schemeClr val="tx2">
                               <a:lumMod val="90000"/>
@@ -13065,7 +13065,7 @@
                         <a:t>슬라이딩 </a:t>
                       </a:r>
                       <a:r>
-                        <a:rPr lang="ko-KR" altLang="en-US" sz="1400" dirty="0">
+                        <a:rPr lang="ko-KR" altLang="en-US" sz="1400" strike="sngStrike" dirty="0">
                           <a:solidFill>
                             <a:schemeClr val="tx2"/>
                           </a:solidFill>
@@ -13073,7 +13073,7 @@
                         <a:t>애니메이션</a:t>
                       </a:r>
                       <a:r>
-                        <a:rPr lang="en-US" altLang="ko-KR" sz="1400" dirty="0">
+                        <a:rPr lang="en-US" altLang="ko-KR" sz="1400" strike="sngStrike" dirty="0">
                           <a:solidFill>
                             <a:schemeClr val="tx2">
                               <a:lumMod val="90000"/>
@@ -13084,7 +13084,7 @@
                         <a:t> ( </a:t>
                       </a:r>
                       <a:r>
-                        <a:rPr lang="ko-KR" altLang="en-US" sz="1400" dirty="0">
+                        <a:rPr lang="ko-KR" altLang="en-US" sz="1400" strike="sngStrike" dirty="0">
                           <a:solidFill>
                             <a:schemeClr val="tx2">
                               <a:lumMod val="90000"/>
@@ -13095,7 +13095,7 @@
                         <a:t>장애물 </a:t>
                       </a:r>
                       <a:r>
-                        <a:rPr lang="en-US" altLang="ko-KR" sz="1400" dirty="0">
+                        <a:rPr lang="en-US" altLang="ko-KR" sz="1400" strike="sngStrike" dirty="0">
                           <a:solidFill>
                             <a:schemeClr val="tx2">
                               <a:lumMod val="90000"/>
@@ -13106,7 +13106,7 @@
                         <a:t>– </a:t>
                       </a:r>
                       <a:r>
-                        <a:rPr lang="ko-KR" altLang="en-US" sz="1400" dirty="0">
+                        <a:rPr lang="ko-KR" altLang="en-US" sz="1400" strike="sngStrike" dirty="0">
                           <a:solidFill>
                             <a:schemeClr val="tx2">
                               <a:lumMod val="90000"/>
@@ -13117,17 +13117,17 @@
                         <a:t>상태변경 </a:t>
                       </a:r>
                       <a:r>
-                        <a:rPr lang="en-US" altLang="ko-KR" sz="1400" dirty="0">
-                          <a:solidFill>
-                            <a:schemeClr val="tx2">
-                              <a:lumMod val="90000"/>
-                              <a:lumOff val="10000"/>
-                            </a:schemeClr>
-                          </a:solidFill>
-                        </a:rPr>
-                        <a:t>) X</a:t>
-                      </a:r>
-                      <a:endParaRPr lang="ko-KR" altLang="en-US" sz="1400" dirty="0">
+                        <a:rPr lang="en-US" altLang="ko-KR" sz="1400" strike="sngStrike" dirty="0">
+                          <a:solidFill>
+                            <a:schemeClr val="tx2">
+                              <a:lumMod val="90000"/>
+                              <a:lumOff val="10000"/>
+                            </a:schemeClr>
+                          </a:solidFill>
+                        </a:rPr>
+                        <a:t>) </a:t>
+                      </a:r>
+                      <a:endParaRPr lang="ko-KR" altLang="en-US" sz="1400" strike="sngStrike" dirty="0">
                         <a:solidFill>
                           <a:schemeClr val="tx2">
                             <a:lumMod val="90000"/>
@@ -13595,8 +13595,27 @@
                             </a:schemeClr>
                           </a:solidFill>
                         </a:rPr>
-                        <a:t>) X</a:t>
-                      </a:r>
+                        <a:t>) </a:t>
+                      </a:r>
+                      <a:r>
+                        <a:rPr lang="ko-KR" altLang="en-US" sz="1400" dirty="0">
+                          <a:solidFill>
+                            <a:schemeClr val="tx2">
+                              <a:lumMod val="90000"/>
+                              <a:lumOff val="10000"/>
+                            </a:schemeClr>
+                          </a:solidFill>
+                        </a:rPr>
+                        <a:t>○</a:t>
+                      </a:r>
+                      <a:endParaRPr lang="en-US" altLang="ko-KR" sz="1400" dirty="0">
+                        <a:solidFill>
+                          <a:schemeClr val="tx2">
+                            <a:lumMod val="90000"/>
+                            <a:lumOff val="10000"/>
+                          </a:schemeClr>
+                        </a:solidFill>
+                      </a:endParaRPr>
                     </a:p>
                     <a:p>
                       <a:pPr marL="0" marR="0" lvl="0" indent="0" algn="ctr" defTabSz="914400" rtl="0" eaLnBrk="1" fontAlgn="auto" latinLnBrk="1" hangingPunct="1">
@@ -13669,16 +13688,19 @@
                             </a:schemeClr>
                           </a:solidFill>
                         </a:rPr>
-                        <a:t>) X</a:t>
-                      </a:r>
-                      <a:endParaRPr lang="ko-KR" altLang="en-US" sz="1400" dirty="0">
-                        <a:solidFill>
-                          <a:schemeClr val="tx2">
-                            <a:lumMod val="90000"/>
-                            <a:lumOff val="10000"/>
-                          </a:schemeClr>
-                        </a:solidFill>
-                      </a:endParaRPr>
+                        <a:t>) </a:t>
+                      </a:r>
+                      <a:r>
+                        <a:rPr lang="ko-KR" altLang="en-US" sz="1400" dirty="0">
+                          <a:solidFill>
+                            <a:schemeClr val="tx2">
+                              <a:lumMod val="90000"/>
+                              <a:lumOff val="10000"/>
+                            </a:schemeClr>
+                          </a:solidFill>
+                        </a:rPr>
+                        <a:t>○</a:t>
+                      </a:r>
                     </a:p>
                   </a:txBody>
                   <a:tcPr anchor="ctr">
@@ -14149,7 +14171,7 @@
                             </a:schemeClr>
                           </a:solidFill>
                         </a:rPr>
-                        <a:t>버그 해결 및 보완</a:t>
+                        <a:t>버그 해결 및 보완 ○</a:t>
                       </a:r>
                     </a:p>
                   </a:txBody>
@@ -14954,7 +14976,7 @@
                             </a:schemeClr>
                           </a:solidFill>
                         </a:rPr>
-                        <a:t>밸런스 수정</a:t>
+                        <a:t>밸런스 수정 </a:t>
                       </a:r>
                     </a:p>
                   </a:txBody>
@@ -15289,7 +15311,7 @@
                             </a:schemeClr>
                           </a:solidFill>
                         </a:rPr>
-                        <a:t>펭귄과의 지정 범위 장애물 이동△</a:t>
+                        <a:t>펭귄과의 지정 범위 장애물 이동 ○</a:t>
                       </a:r>
                       <a:endParaRPr lang="en-US" altLang="ko-KR" sz="1400" dirty="0">
                         <a:solidFill>
@@ -15403,7 +15425,7 @@
                             </a:schemeClr>
                           </a:solidFill>
                         </a:rPr>
-                        <a:t>펭귄을 따라옴△</a:t>
+                        <a:t>펭귄을 따라옴 ○</a:t>
                       </a:r>
                       <a:endParaRPr lang="en-US" altLang="ko-KR" sz="1400" dirty="0">
                         <a:solidFill>

</xml_diff>